<commit_message>
hotfix: Minor updates on the optimization slides
</commit_message>
<xml_diff>
--- a/source/optimization/dp/_static/dynamic_programming.pptx
+++ b/source/optimization/dp/_static/dynamic_programming.pptx
@@ -220,7 +220,7 @@
           <a:p>
             <a:fld id="{84F29782-C61A-CD4C-9376-B0A272778357}" type="datetimeFigureOut">
               <a:rPr lang="en-NO" smtClean="0"/>
-              <a:t>29/10/2023</a:t>
+              <a:t>30/10/2023</a:t>
             </a:fld>
             <a:endParaRPr lang="en-NO"/>
           </a:p>
@@ -4313,10 +4313,10 @@
       </p:sp>
       <p:sp>
         <p:nvSpPr>
-          <p:cNvPr id="8" name="TextBox 7">
-            <a:extLst>
-              <a:ext uri="{FF2B5EF4-FFF2-40B4-BE49-F238E27FC236}">
-                <a16:creationId xmlns:a16="http://schemas.microsoft.com/office/drawing/2014/main" id="{F80DB02D-C61E-A46C-F657-07F2780FD592}"/>
+          <p:cNvPr id="9" name="TextBox 8">
+            <a:extLst>
+              <a:ext uri="{FF2B5EF4-FFF2-40B4-BE49-F238E27FC236}">
+                <a16:creationId xmlns:a16="http://schemas.microsoft.com/office/drawing/2014/main" id="{51476EF5-23FC-0443-A4A6-E618B41B100E}"/>
               </a:ext>
             </a:extLst>
           </p:cNvPr>
@@ -4325,8 +4325,8 @@
         </p:nvSpPr>
         <p:spPr>
           <a:xfrm>
-            <a:off x="6449568" y="5713412"/>
-            <a:ext cx="5327904" cy="646331"/>
+            <a:off x="8119872" y="5598588"/>
+            <a:ext cx="3578623" cy="646331"/>
           </a:xfrm>
           <a:prstGeom prst="rect">
             <a:avLst/>
@@ -4334,53 +4334,66 @@
           <a:noFill/>
         </p:spPr>
         <p:txBody>
-          <a:bodyPr wrap="square">
+          <a:bodyPr wrap="square" rtlCol="0">
             <a:spAutoFit/>
           </a:bodyPr>
           <a:lstStyle/>
           <a:p>
             <a:pPr algn="r"/>
             <a:r>
-              <a:rPr lang="en-GB" b="0" i="0" dirty="0">
+              <a:rPr lang="en-GB" i="1" dirty="0">
                 <a:solidFill>
                   <a:schemeClr val="accent6"/>
                 </a:solidFill>
                 <a:effectLst/>
                 <a:latin typeface="Montserrat" pitchFamily="2" charset="77"/>
               </a:rPr>
-              <a:t>Go to </a:t>
-            </a:r>
-            <a:r>
-              <a:rPr lang="en-GB" b="1" i="0" dirty="0" err="1">
+              <a:t>Ask questions on </a:t>
+            </a:r>
+            <a:r>
+              <a:rPr lang="en-GB" b="1" i="1" dirty="0" err="1">
                 <a:solidFill>
                   <a:schemeClr val="accent6"/>
                 </a:solidFill>
                 <a:effectLst/>
                 <a:latin typeface="Montserrat" pitchFamily="2" charset="77"/>
               </a:rPr>
-              <a:t>www.menti.com</a:t>
-            </a:r>
-            <a:r>
-              <a:rPr lang="en-GB" b="0" i="0" dirty="0">
+              <a:t>menti.com</a:t>
+            </a:r>
+            <a:r>
+              <a:rPr lang="en-GB" i="1" dirty="0">
                 <a:solidFill>
                   <a:schemeClr val="accent6"/>
                 </a:solidFill>
                 <a:effectLst/>
                 <a:latin typeface="Montserrat" pitchFamily="2" charset="77"/>
               </a:rPr>
-              <a:t> and use the code </a:t>
-            </a:r>
-            <a:r>
-              <a:rPr lang="en-GB" b="1" i="0" dirty="0">
+              <a:t> </a:t>
+            </a:r>
+          </a:p>
+          <a:p>
+            <a:pPr algn="r"/>
+            <a:r>
+              <a:rPr lang="en-GB" i="1" dirty="0">
                 <a:solidFill>
                   <a:schemeClr val="accent6"/>
                 </a:solidFill>
                 <a:effectLst/>
                 <a:latin typeface="Montserrat" pitchFamily="2" charset="77"/>
               </a:rPr>
-              <a:t>2226 1383</a:t>
-            </a:r>
-            <a:endParaRPr lang="en-NO" dirty="0">
+              <a:t>with code </a:t>
+            </a:r>
+            <a:r>
+              <a:rPr lang="en-GB" b="1" i="1" dirty="0">
+                <a:solidFill>
+                  <a:schemeClr val="accent6"/>
+                </a:solidFill>
+                <a:effectLst/>
+                <a:latin typeface="Montserrat" pitchFamily="2" charset="77"/>
+              </a:rPr>
+              <a:t>3490 3073</a:t>
+            </a:r>
+            <a:endParaRPr lang="en-NO" b="1" i="1" dirty="0">
               <a:solidFill>
                 <a:schemeClr val="accent6"/>
               </a:solidFill>

</xml_diff>